<commit_message>
Add NVIDIA-specific architecture diagrams for all 3 solutions
- Created generate_diagram.py scripts using Python diagrams library for automated diagram generation
- Generated architecture-diagram.png files for DGX SuperPOD (184KB), GPU Compute Cluster (210KB), and Omniverse Enterprise (187KB)
- Added architecture-diagram.drawio files for manual editing in diagrams.net with component-specific instructions
- DGX SuperPOD diagram shows 8x DGX H100 systems, InfiniBand Quantum-2 400G fabric, Base Command Manager, and 1 PB storage
- GPU Compute Cluster diagram shows 8x Dell PowerEdge R750xa servers with 32x A100 GPUs, Kubernetes with GPU Operator, and MLOps platform
- Omniverse Enterprise diagram shows 50x RTX workstations, Nucleus HA cluster, CAD tool connectors, and rendering farm
- Regenerated all solution briefing PowerPoint presentations with embedded architecture diagrams
- All diagrams use consistent color coding and professional layout matching EO Framework standards
</commit_message>
<xml_diff>
--- a/solutions/hashicorp/cloud/multi-cloud-platform/presales/solution-briefing.pptx
+++ b/solutions/hashicorp/cloud/multi-cloud-platform/presales/solution-briefing.pptx
@@ -757,6 +757,39 @@
       </p:grpSpPr>
       <p:sp>
         <p:nvSpPr>
+          <p:cNvPr id="12" name="Picture Placeholder 13">
+            <a:extLst>
+              <a:ext uri="{FF2B5EF4-FFF2-40B4-BE49-F238E27FC236}">
+                <a16:creationId xmlns:a16="http://schemas.microsoft.com/office/drawing/2014/main" id="{2DB97592-C4D5-B315-7F11-AA14F6EE8A62}"/>
+              </a:ext>
+            </a:extLst>
+          </p:cNvPr>
+          <p:cNvSpPr>
+            <a:spLocks noGrp="1"/>
+          </p:cNvSpPr>
+          <p:nvPr>
+            <p:ph type="pic" sz="quarter" idx="13"/>
+          </p:nvPr>
+        </p:nvSpPr>
+        <p:spPr>
+          <a:xfrm>
+            <a:off x="313593" y="4536078"/>
+            <a:ext cx="2143858" cy="529698"/>
+          </a:xfrm>
+          <a:prstGeom prst="rect">
+            <a:avLst/>
+          </a:prstGeom>
+        </p:spPr>
+        <p:txBody>
+          <a:bodyPr/>
+          <a:lstStyle/>
+          <a:p>
+            <a:endParaRPr lang="en-US" dirty="0"/>
+          </a:p>
+        </p:txBody>
+      </p:sp>
+      <p:sp>
+        <p:nvSpPr>
           <p:cNvPr id="3" name="Shape 1">
             <a:extLst>
               <a:ext uri="{FF2B5EF4-FFF2-40B4-BE49-F238E27FC236}">
@@ -846,39 +879,6 @@
               <a:rPr lang="en-US" dirty="0"/>
               <a:t>Slide Title</a:t>
             </a:r>
-          </a:p>
-        </p:txBody>
-      </p:sp>
-      <p:sp>
-        <p:nvSpPr>
-          <p:cNvPr id="12" name="Picture Placeholder 13">
-            <a:extLst>
-              <a:ext uri="{FF2B5EF4-FFF2-40B4-BE49-F238E27FC236}">
-                <a16:creationId xmlns:a16="http://schemas.microsoft.com/office/drawing/2014/main" id="{2DB97592-C4D5-B315-7F11-AA14F6EE8A62}"/>
-              </a:ext>
-            </a:extLst>
-          </p:cNvPr>
-          <p:cNvSpPr>
-            <a:spLocks noGrp="1"/>
-          </p:cNvSpPr>
-          <p:nvPr>
-            <p:ph type="pic" sz="quarter" idx="13"/>
-          </p:nvPr>
-        </p:nvSpPr>
-        <p:spPr>
-          <a:xfrm>
-            <a:off x="313593" y="4536078"/>
-            <a:ext cx="2143858" cy="529698"/>
-          </a:xfrm>
-          <a:prstGeom prst="rect">
-            <a:avLst/>
-          </a:prstGeom>
-        </p:spPr>
-        <p:txBody>
-          <a:bodyPr/>
-          <a:lstStyle/>
-          <a:p>
-            <a:endParaRPr lang="en-US" dirty="0"/>
           </a:p>
         </p:txBody>
       </p:sp>
@@ -1035,6 +1035,39 @@
       </p:grpSpPr>
       <p:sp>
         <p:nvSpPr>
+          <p:cNvPr id="12" name="Picture Placeholder 13">
+            <a:extLst>
+              <a:ext uri="{FF2B5EF4-FFF2-40B4-BE49-F238E27FC236}">
+                <a16:creationId xmlns:a16="http://schemas.microsoft.com/office/drawing/2014/main" id="{2DB97592-C4D5-B315-7F11-AA14F6EE8A62}"/>
+              </a:ext>
+            </a:extLst>
+          </p:cNvPr>
+          <p:cNvSpPr>
+            <a:spLocks noGrp="1"/>
+          </p:cNvSpPr>
+          <p:nvPr>
+            <p:ph type="pic" sz="quarter" idx="13"/>
+          </p:nvPr>
+        </p:nvSpPr>
+        <p:spPr>
+          <a:xfrm>
+            <a:off x="313593" y="4536078"/>
+            <a:ext cx="2143858" cy="529698"/>
+          </a:xfrm>
+          <a:prstGeom prst="rect">
+            <a:avLst/>
+          </a:prstGeom>
+        </p:spPr>
+        <p:txBody>
+          <a:bodyPr/>
+          <a:lstStyle/>
+          <a:p>
+            <a:endParaRPr lang="en-US" dirty="0"/>
+          </a:p>
+        </p:txBody>
+      </p:sp>
+      <p:sp>
+        <p:nvSpPr>
           <p:cNvPr id="3" name="Shape 1">
             <a:extLst>
               <a:ext uri="{FF2B5EF4-FFF2-40B4-BE49-F238E27FC236}">
@@ -1124,39 +1157,6 @@
               <a:rPr lang="en-US" dirty="0"/>
               <a:t>Bullet Points</a:t>
             </a:r>
-          </a:p>
-        </p:txBody>
-      </p:sp>
-      <p:sp>
-        <p:nvSpPr>
-          <p:cNvPr id="12" name="Picture Placeholder 13">
-            <a:extLst>
-              <a:ext uri="{FF2B5EF4-FFF2-40B4-BE49-F238E27FC236}">
-                <a16:creationId xmlns:a16="http://schemas.microsoft.com/office/drawing/2014/main" id="{2DB97592-C4D5-B315-7F11-AA14F6EE8A62}"/>
-              </a:ext>
-            </a:extLst>
-          </p:cNvPr>
-          <p:cNvSpPr>
-            <a:spLocks noGrp="1"/>
-          </p:cNvSpPr>
-          <p:nvPr>
-            <p:ph type="pic" sz="quarter" idx="13"/>
-          </p:nvPr>
-        </p:nvSpPr>
-        <p:spPr>
-          <a:xfrm>
-            <a:off x="313593" y="4536078"/>
-            <a:ext cx="2143858" cy="529698"/>
-          </a:xfrm>
-          <a:prstGeom prst="rect">
-            <a:avLst/>
-          </a:prstGeom>
-        </p:spPr>
-        <p:txBody>
-          <a:bodyPr/>
-          <a:lstStyle/>
-          <a:p>
-            <a:endParaRPr lang="en-US" dirty="0"/>
           </a:p>
         </p:txBody>
       </p:sp>
@@ -1299,6 +1299,39 @@
       </p:grpSpPr>
       <p:sp>
         <p:nvSpPr>
+          <p:cNvPr id="10" name="Picture Placeholder 13">
+            <a:extLst>
+              <a:ext uri="{FF2B5EF4-FFF2-40B4-BE49-F238E27FC236}">
+                <a16:creationId xmlns:a16="http://schemas.microsoft.com/office/drawing/2014/main" id="{6A0FA445-7602-F06E-EC73-5504EBF827CC}"/>
+              </a:ext>
+            </a:extLst>
+          </p:cNvPr>
+          <p:cNvSpPr>
+            <a:spLocks noGrp="1"/>
+          </p:cNvSpPr>
+          <p:nvPr>
+            <p:ph type="pic" sz="quarter" idx="14"/>
+          </p:nvPr>
+        </p:nvSpPr>
+        <p:spPr>
+          <a:xfrm>
+            <a:off x="313592" y="4536078"/>
+            <a:ext cx="2121877" cy="529698"/>
+          </a:xfrm>
+          <a:prstGeom prst="rect">
+            <a:avLst/>
+          </a:prstGeom>
+        </p:spPr>
+        <p:txBody>
+          <a:bodyPr/>
+          <a:lstStyle/>
+          <a:p>
+            <a:endParaRPr lang="en-US" dirty="0"/>
+          </a:p>
+        </p:txBody>
+      </p:sp>
+      <p:sp>
+        <p:nvSpPr>
           <p:cNvPr id="3" name="Shape 1">
             <a:extLst>
               <a:ext uri="{FF2B5EF4-FFF2-40B4-BE49-F238E27FC236}">
@@ -1388,39 +1421,6 @@
               <a:rPr lang="en-US" dirty="0"/>
               <a:t>Two Column Layout</a:t>
             </a:r>
-          </a:p>
-        </p:txBody>
-      </p:sp>
-      <p:sp>
-        <p:nvSpPr>
-          <p:cNvPr id="10" name="Picture Placeholder 13">
-            <a:extLst>
-              <a:ext uri="{FF2B5EF4-FFF2-40B4-BE49-F238E27FC236}">
-                <a16:creationId xmlns:a16="http://schemas.microsoft.com/office/drawing/2014/main" id="{6A0FA445-7602-F06E-EC73-5504EBF827CC}"/>
-              </a:ext>
-            </a:extLst>
-          </p:cNvPr>
-          <p:cNvSpPr>
-            <a:spLocks noGrp="1"/>
-          </p:cNvSpPr>
-          <p:nvPr>
-            <p:ph type="pic" sz="quarter" idx="14"/>
-          </p:nvPr>
-        </p:nvSpPr>
-        <p:spPr>
-          <a:xfrm>
-            <a:off x="313592" y="4536078"/>
-            <a:ext cx="2121877" cy="529698"/>
-          </a:xfrm>
-          <a:prstGeom prst="rect">
-            <a:avLst/>
-          </a:prstGeom>
-        </p:spPr>
-        <p:txBody>
-          <a:bodyPr/>
-          <a:lstStyle/>
-          <a:p>
-            <a:endParaRPr lang="en-US" dirty="0"/>
           </a:p>
         </p:txBody>
       </p:sp>
@@ -1668,6 +1668,39 @@
       </p:grpSpPr>
       <p:sp>
         <p:nvSpPr>
+          <p:cNvPr id="12" name="Picture Placeholder 13">
+            <a:extLst>
+              <a:ext uri="{FF2B5EF4-FFF2-40B4-BE49-F238E27FC236}">
+                <a16:creationId xmlns:a16="http://schemas.microsoft.com/office/drawing/2014/main" id="{2DB97592-C4D5-B315-7F11-AA14F6EE8A62}"/>
+              </a:ext>
+            </a:extLst>
+          </p:cNvPr>
+          <p:cNvSpPr>
+            <a:spLocks noGrp="1"/>
+          </p:cNvSpPr>
+          <p:nvPr>
+            <p:ph type="pic" sz="quarter" idx="13"/>
+          </p:nvPr>
+        </p:nvSpPr>
+        <p:spPr>
+          <a:xfrm>
+            <a:off x="313592" y="4536078"/>
+            <a:ext cx="2126273" cy="529698"/>
+          </a:xfrm>
+          <a:prstGeom prst="rect">
+            <a:avLst/>
+          </a:prstGeom>
+        </p:spPr>
+        <p:txBody>
+          <a:bodyPr/>
+          <a:lstStyle/>
+          <a:p>
+            <a:endParaRPr lang="en-US" dirty="0"/>
+          </a:p>
+        </p:txBody>
+      </p:sp>
+      <p:sp>
+        <p:nvSpPr>
           <p:cNvPr id="3" name="Shape 1">
             <a:extLst>
               <a:ext uri="{FF2B5EF4-FFF2-40B4-BE49-F238E27FC236}">
@@ -1783,39 +1816,6 @@
           </a:p>
           <a:p>
             <a:pPr lvl="0"/>
-            <a:endParaRPr lang="en-US" dirty="0"/>
-          </a:p>
-        </p:txBody>
-      </p:sp>
-      <p:sp>
-        <p:nvSpPr>
-          <p:cNvPr id="12" name="Picture Placeholder 13">
-            <a:extLst>
-              <a:ext uri="{FF2B5EF4-FFF2-40B4-BE49-F238E27FC236}">
-                <a16:creationId xmlns:a16="http://schemas.microsoft.com/office/drawing/2014/main" id="{2DB97592-C4D5-B315-7F11-AA14F6EE8A62}"/>
-              </a:ext>
-            </a:extLst>
-          </p:cNvPr>
-          <p:cNvSpPr>
-            <a:spLocks noGrp="1"/>
-          </p:cNvSpPr>
-          <p:nvPr>
-            <p:ph type="pic" sz="quarter" idx="13"/>
-          </p:nvPr>
-        </p:nvSpPr>
-        <p:spPr>
-          <a:xfrm>
-            <a:off x="313592" y="4536078"/>
-            <a:ext cx="2126273" cy="529698"/>
-          </a:xfrm>
-          <a:prstGeom prst="rect">
-            <a:avLst/>
-          </a:prstGeom>
-        </p:spPr>
-        <p:txBody>
-          <a:bodyPr/>
-          <a:lstStyle/>
-          <a:p>
             <a:endParaRPr lang="en-US" dirty="0"/>
           </a:p>
         </p:txBody>
@@ -1927,6 +1927,39 @@
       </p:grpSpPr>
       <p:sp>
         <p:nvSpPr>
+          <p:cNvPr id="10" name="Picture Placeholder 13">
+            <a:extLst>
+              <a:ext uri="{FF2B5EF4-FFF2-40B4-BE49-F238E27FC236}">
+                <a16:creationId xmlns:a16="http://schemas.microsoft.com/office/drawing/2014/main" id="{6A0FA445-7602-F06E-EC73-5504EBF827CC}"/>
+              </a:ext>
+            </a:extLst>
+          </p:cNvPr>
+          <p:cNvSpPr>
+            <a:spLocks noGrp="1"/>
+          </p:cNvSpPr>
+          <p:nvPr>
+            <p:ph type="pic" sz="quarter" idx="14"/>
+          </p:nvPr>
+        </p:nvSpPr>
+        <p:spPr>
+          <a:xfrm>
+            <a:off x="313592" y="4536078"/>
+            <a:ext cx="2130670" cy="529698"/>
+          </a:xfrm>
+          <a:prstGeom prst="rect">
+            <a:avLst/>
+          </a:prstGeom>
+        </p:spPr>
+        <p:txBody>
+          <a:bodyPr/>
+          <a:lstStyle/>
+          <a:p>
+            <a:endParaRPr lang="en-US" dirty="0"/>
+          </a:p>
+        </p:txBody>
+      </p:sp>
+      <p:sp>
+        <p:nvSpPr>
           <p:cNvPr id="3" name="Shape 1">
             <a:extLst>
               <a:ext uri="{FF2B5EF4-FFF2-40B4-BE49-F238E27FC236}">
@@ -2016,39 +2049,6 @@
               <a:rPr lang="en-US" dirty="0"/>
               <a:t>Visual Content</a:t>
             </a:r>
-          </a:p>
-        </p:txBody>
-      </p:sp>
-      <p:sp>
-        <p:nvSpPr>
-          <p:cNvPr id="10" name="Picture Placeholder 13">
-            <a:extLst>
-              <a:ext uri="{FF2B5EF4-FFF2-40B4-BE49-F238E27FC236}">
-                <a16:creationId xmlns:a16="http://schemas.microsoft.com/office/drawing/2014/main" id="{6A0FA445-7602-F06E-EC73-5504EBF827CC}"/>
-              </a:ext>
-            </a:extLst>
-          </p:cNvPr>
-          <p:cNvSpPr>
-            <a:spLocks noGrp="1"/>
-          </p:cNvSpPr>
-          <p:nvPr>
-            <p:ph type="pic" sz="quarter" idx="14"/>
-          </p:nvPr>
-        </p:nvSpPr>
-        <p:spPr>
-          <a:xfrm>
-            <a:off x="313592" y="4536078"/>
-            <a:ext cx="2130670" cy="529698"/>
-          </a:xfrm>
-          <a:prstGeom prst="rect">
-            <a:avLst/>
-          </a:prstGeom>
-        </p:spPr>
-        <p:txBody>
-          <a:bodyPr/>
-          <a:lstStyle/>
-          <a:p>
-            <a:endParaRPr lang="en-US" dirty="0"/>
           </a:p>
         </p:txBody>
       </p:sp>
@@ -2244,6 +2244,39 @@
       </p:grpSpPr>
       <p:sp>
         <p:nvSpPr>
+          <p:cNvPr id="10" name="Picture Placeholder 13">
+            <a:extLst>
+              <a:ext uri="{FF2B5EF4-FFF2-40B4-BE49-F238E27FC236}">
+                <a16:creationId xmlns:a16="http://schemas.microsoft.com/office/drawing/2014/main" id="{6A0FA445-7602-F06E-EC73-5504EBF827CC}"/>
+              </a:ext>
+            </a:extLst>
+          </p:cNvPr>
+          <p:cNvSpPr>
+            <a:spLocks noGrp="1"/>
+          </p:cNvSpPr>
+          <p:nvPr>
+            <p:ph type="pic" sz="quarter" idx="14"/>
+          </p:nvPr>
+        </p:nvSpPr>
+        <p:spPr>
+          <a:xfrm>
+            <a:off x="313592" y="4536078"/>
+            <a:ext cx="2104294" cy="529698"/>
+          </a:xfrm>
+          <a:prstGeom prst="rect">
+            <a:avLst/>
+          </a:prstGeom>
+        </p:spPr>
+        <p:txBody>
+          <a:bodyPr/>
+          <a:lstStyle/>
+          <a:p>
+            <a:endParaRPr lang="en-US" dirty="0"/>
+          </a:p>
+        </p:txBody>
+      </p:sp>
+      <p:sp>
+        <p:nvSpPr>
           <p:cNvPr id="3" name="Shape 1">
             <a:extLst>
               <a:ext uri="{FF2B5EF4-FFF2-40B4-BE49-F238E27FC236}">
@@ -2333,39 +2366,6 @@
               <a:rPr lang="en-US" dirty="0"/>
               <a:t>Data Visualization</a:t>
             </a:r>
-          </a:p>
-        </p:txBody>
-      </p:sp>
-      <p:sp>
-        <p:nvSpPr>
-          <p:cNvPr id="10" name="Picture Placeholder 13">
-            <a:extLst>
-              <a:ext uri="{FF2B5EF4-FFF2-40B4-BE49-F238E27FC236}">
-                <a16:creationId xmlns:a16="http://schemas.microsoft.com/office/drawing/2014/main" id="{6A0FA445-7602-F06E-EC73-5504EBF827CC}"/>
-              </a:ext>
-            </a:extLst>
-          </p:cNvPr>
-          <p:cNvSpPr>
-            <a:spLocks noGrp="1"/>
-          </p:cNvSpPr>
-          <p:nvPr>
-            <p:ph type="pic" sz="quarter" idx="14"/>
-          </p:nvPr>
-        </p:nvSpPr>
-        <p:spPr>
-          <a:xfrm>
-            <a:off x="313592" y="4536078"/>
-            <a:ext cx="2104294" cy="529698"/>
-          </a:xfrm>
-          <a:prstGeom prst="rect">
-            <a:avLst/>
-          </a:prstGeom>
-        </p:spPr>
-        <p:txBody>
-          <a:bodyPr/>
-          <a:lstStyle/>
-          <a:p>
-            <a:endParaRPr lang="en-US" dirty="0"/>
           </a:p>
         </p:txBody>
       </p:sp>
@@ -3487,7 +3487,7 @@
       <p:grpSpPr/>
       <p:sp>
         <p:nvSpPr>
-          <p:cNvPr id="2" name="Text Placeholder 1"/>
+          <p:cNvPr id="3" name="Text Placeholder 2"/>
           <p:cNvSpPr>
             <a:spLocks noGrp="1"/>
           </p:cNvSpPr>
@@ -3791,7 +3791,7 @@
       <p:grpSpPr/>
       <p:sp>
         <p:nvSpPr>
-          <p:cNvPr id="2" name="Text Placeholder 1"/>
+          <p:cNvPr id="3" name="Text Placeholder 2"/>
           <p:cNvSpPr>
             <a:spLocks noGrp="1"/>
           </p:cNvSpPr>
@@ -3966,7 +3966,7 @@
       <p:grpSpPr/>
       <p:sp>
         <p:nvSpPr>
-          <p:cNvPr id="2" name="Text Placeholder 1"/>
+          <p:cNvPr id="3" name="Text Placeholder 2"/>
           <p:cNvSpPr>
             <a:spLocks noGrp="1"/>
           </p:cNvSpPr>
@@ -4844,7 +4844,7 @@
       <p:grpSpPr/>
       <p:sp>
         <p:nvSpPr>
-          <p:cNvPr id="2" name="Text Placeholder 1"/>
+          <p:cNvPr id="3" name="Text Placeholder 2"/>
           <p:cNvSpPr>
             <a:spLocks noGrp="1"/>
           </p:cNvSpPr>
@@ -4888,7 +4888,7 @@
           <a:p>
             <a:pPr lvl="1"/>
             <a:r>
-              <a:t>Terraform Cloud for infrastructure as code with workspaces state management and policy enforcement</a:t>
+              <a:t>Terraform Cloud for infrastructure as code with workspaces and policy enforcement</a:t>
             </a:r>
           </a:p>
           <a:p>
@@ -5033,7 +5033,7 @@
       <p:grpSpPr/>
       <p:sp>
         <p:nvSpPr>
-          <p:cNvPr id="2" name="Text Placeholder 1"/>
+          <p:cNvPr id="3" name="Text Placeholder 2"/>
           <p:cNvSpPr>
             <a:spLocks noGrp="1"/>
           </p:cNvSpPr>
@@ -5217,7 +5217,7 @@
       <p:grpSpPr/>
       <p:sp>
         <p:nvSpPr>
-          <p:cNvPr id="2" name="Text Placeholder 1"/>
+          <p:cNvPr id="3" name="Text Placeholder 2"/>
           <p:cNvSpPr>
             <a:spLocks noGrp="1"/>
           </p:cNvSpPr>
@@ -5636,7 +5636,7 @@
       <p:grpSpPr/>
       <p:sp>
         <p:nvSpPr>
-          <p:cNvPr id="2" name="Text Placeholder 1"/>
+          <p:cNvPr id="3" name="Text Placeholder 2"/>
           <p:cNvSpPr>
             <a:spLocks noGrp="1"/>
           </p:cNvSpPr>
@@ -5809,7 +5809,7 @@
       <p:grpSpPr/>
       <p:sp>
         <p:nvSpPr>
-          <p:cNvPr id="2" name="Text Placeholder 1"/>
+          <p:cNvPr id="3" name="Text Placeholder 2"/>
           <p:cNvSpPr>
             <a:spLocks noGrp="1"/>
           </p:cNvSpPr>
@@ -5996,7 +5996,7 @@
       <p:grpSpPr/>
       <p:sp>
         <p:nvSpPr>
-          <p:cNvPr id="2" name="Text Placeholder 1"/>
+          <p:cNvPr id="3" name="Text Placeholder 2"/>
           <p:cNvSpPr>
             <a:spLocks noGrp="1"/>
           </p:cNvSpPr>

</xml_diff>